<commit_message>
poster changes, team comp av viz
</commit_message>
<xml_diff>
--- a/poster.pptx
+++ b/poster.pptx
@@ -5469,7 +5469,7 @@
               <a:graphicData uri="http://schemas.openxmlformats.org/presentationml/2006/ole">
                 <mc:AlternateContent xmlns:mc="http://schemas.openxmlformats.org/markup-compatibility/2006">
                   <mc:Choice xmlns:v="urn:schemas-microsoft-com:vml" Requires="v">
-                    <p:oleObj spid="_x0000_s1128" name="Image" r:id="rId8" imgW="1828440" imgH="1117440" progId="Photoshop.Image.13">
+                    <p:oleObj spid="_x0000_s1169" name="Image" r:id="rId8" imgW="1828440" imgH="1117440" progId="Photoshop.Image.13">
                       <p:embed/>
                     </p:oleObj>
                   </mc:Choice>
@@ -5526,7 +5526,7 @@
               <a:graphicData uri="http://schemas.openxmlformats.org/presentationml/2006/ole">
                 <mc:AlternateContent xmlns:mc="http://schemas.openxmlformats.org/markup-compatibility/2006">
                   <mc:Choice xmlns:v="urn:schemas-microsoft-com:vml" Requires="v">
-                    <p:oleObj spid="_x0000_s1129" name="Image" r:id="rId10" imgW="1828440" imgH="1117440" progId="Photoshop.Image.13">
+                    <p:oleObj spid="_x0000_s1170" name="Image" r:id="rId10" imgW="1828440" imgH="1117440" progId="Photoshop.Image.13">
                       <p:embed/>
                     </p:oleObj>
                   </mc:Choice>
@@ -6654,7 +6654,7 @@
             <a:graphicData uri="http://schemas.openxmlformats.org/presentationml/2006/ole">
               <mc:AlternateContent xmlns:mc="http://schemas.openxmlformats.org/markup-compatibility/2006">
                 <mc:Choice xmlns:v="urn:schemas-microsoft-com:vml" Requires="v">
-                  <p:oleObj spid="_x0000_s1130" name="Image" r:id="rId12" imgW="4571280" imgH="1688760" progId="Photoshop.Image.13">
+                  <p:oleObj spid="_x0000_s1171" name="Image" r:id="rId12" imgW="4571280" imgH="1688760" progId="Photoshop.Image.13">
                     <p:embed/>
                   </p:oleObj>
                 </mc:Choice>
@@ -6738,7 +6738,7 @@
             <a:graphicData uri="http://schemas.openxmlformats.org/presentationml/2006/ole">
               <mc:AlternateContent xmlns:mc="http://schemas.openxmlformats.org/markup-compatibility/2006">
                 <mc:Choice xmlns:v="urn:schemas-microsoft-com:vml" Requires="v">
-                  <p:oleObj spid="_x0000_s1131" name="Image" r:id="rId15" imgW="1574280" imgH="1053720" progId="Photoshop.Image.13">
+                  <p:oleObj spid="_x0000_s1172" name="Image" r:id="rId15" imgW="1574280" imgH="1053720" progId="Photoshop.Image.13">
                     <p:embed/>
                   </p:oleObj>
                 </mc:Choice>
@@ -8695,7 +8695,7 @@
             <a:graphicData uri="http://schemas.openxmlformats.org/presentationml/2006/ole">
               <mc:AlternateContent xmlns:mc="http://schemas.openxmlformats.org/markup-compatibility/2006">
                 <mc:Choice xmlns:v="urn:schemas-microsoft-com:vml" Requires="v">
-                  <p:oleObj spid="_x0000_s2152" name="Image" r:id="rId4" imgW="4571280" imgH="1688760" progId="Photoshop.Image.13">
+                  <p:oleObj spid="_x0000_s2193" name="Image" r:id="rId4" imgW="4571280" imgH="1688760" progId="Photoshop.Image.13">
                     <p:embed/>
                   </p:oleObj>
                 </mc:Choice>
@@ -8779,7 +8779,7 @@
             <a:graphicData uri="http://schemas.openxmlformats.org/presentationml/2006/ole">
               <mc:AlternateContent xmlns:mc="http://schemas.openxmlformats.org/markup-compatibility/2006">
                 <mc:Choice xmlns:v="urn:schemas-microsoft-com:vml" Requires="v">
-                  <p:oleObj spid="_x0000_s2153" name="Image" r:id="rId7" imgW="1574280" imgH="1053720" progId="Photoshop.Image.13">
+                  <p:oleObj spid="_x0000_s2194" name="Image" r:id="rId7" imgW="1574280" imgH="1053720" progId="Photoshop.Image.13">
                     <p:embed/>
                   </p:oleObj>
                 </mc:Choice>
@@ -10175,7 +10175,7 @@
               <a:graphicData uri="http://schemas.openxmlformats.org/presentationml/2006/ole">
                 <mc:AlternateContent xmlns:mc="http://schemas.openxmlformats.org/markup-compatibility/2006">
                   <mc:Choice xmlns:v="urn:schemas-microsoft-com:vml" Requires="v">
-                    <p:oleObj spid="_x0000_s2154" name="Image" r:id="rId15" imgW="1828440" imgH="1117440" progId="Photoshop.Image.13">
+                    <p:oleObj spid="_x0000_s2195" name="Image" r:id="rId15" imgW="1828440" imgH="1117440" progId="Photoshop.Image.13">
                       <p:embed/>
                     </p:oleObj>
                   </mc:Choice>
@@ -10232,7 +10232,7 @@
               <a:graphicData uri="http://schemas.openxmlformats.org/presentationml/2006/ole">
                 <mc:AlternateContent xmlns:mc="http://schemas.openxmlformats.org/markup-compatibility/2006">
                   <mc:Choice xmlns:v="urn:schemas-microsoft-com:vml" Requires="v">
-                    <p:oleObj spid="_x0000_s2155" name="Image" r:id="rId17" imgW="1828440" imgH="1117440" progId="Photoshop.Image.13">
+                    <p:oleObj spid="_x0000_s2196" name="Image" r:id="rId17" imgW="1828440" imgH="1117440" progId="Photoshop.Image.13">
                       <p:embed/>
                     </p:oleObj>
                   </mc:Choice>
@@ -12144,7 +12144,7 @@
             <a:graphicData uri="http://schemas.openxmlformats.org/presentationml/2006/ole">
               <mc:AlternateContent xmlns:mc="http://schemas.openxmlformats.org/markup-compatibility/2006">
                 <mc:Choice xmlns:v="urn:schemas-microsoft-com:vml" Requires="v">
-                  <p:oleObj spid="_x0000_s3176" name="Image" r:id="rId4" imgW="4571280" imgH="1688760" progId="Photoshop.Image.13">
+                  <p:oleObj spid="_x0000_s3217" name="Image" r:id="rId4" imgW="4571280" imgH="1688760" progId="Photoshop.Image.13">
                     <p:embed/>
                   </p:oleObj>
                 </mc:Choice>
@@ -12228,7 +12228,7 @@
             <a:graphicData uri="http://schemas.openxmlformats.org/presentationml/2006/ole">
               <mc:AlternateContent xmlns:mc="http://schemas.openxmlformats.org/markup-compatibility/2006">
                 <mc:Choice xmlns:v="urn:schemas-microsoft-com:vml" Requires="v">
-                  <p:oleObj spid="_x0000_s3177" name="Image" r:id="rId7" imgW="1574280" imgH="1053720" progId="Photoshop.Image.13">
+                  <p:oleObj spid="_x0000_s3218" name="Image" r:id="rId7" imgW="1574280" imgH="1053720" progId="Photoshop.Image.13">
                     <p:embed/>
                   </p:oleObj>
                 </mc:Choice>
@@ -13624,7 +13624,7 @@
               <a:graphicData uri="http://schemas.openxmlformats.org/presentationml/2006/ole">
                 <mc:AlternateContent xmlns:mc="http://schemas.openxmlformats.org/markup-compatibility/2006">
                   <mc:Choice xmlns:v="urn:schemas-microsoft-com:vml" Requires="v">
-                    <p:oleObj spid="_x0000_s3178" name="Image" r:id="rId15" imgW="1828440" imgH="1117440" progId="Photoshop.Image.13">
+                    <p:oleObj spid="_x0000_s3219" name="Image" r:id="rId15" imgW="1828440" imgH="1117440" progId="Photoshop.Image.13">
                       <p:embed/>
                     </p:oleObj>
                   </mc:Choice>
@@ -13681,7 +13681,7 @@
               <a:graphicData uri="http://schemas.openxmlformats.org/presentationml/2006/ole">
                 <mc:AlternateContent xmlns:mc="http://schemas.openxmlformats.org/markup-compatibility/2006">
                   <mc:Choice xmlns:v="urn:schemas-microsoft-com:vml" Requires="v">
-                    <p:oleObj spid="_x0000_s3179" name="Image" r:id="rId17" imgW="1828440" imgH="1117440" progId="Photoshop.Image.13">
+                    <p:oleObj spid="_x0000_s3220" name="Image" r:id="rId17" imgW="1828440" imgH="1117440" progId="Photoshop.Image.13">
                       <p:embed/>
                     </p:oleObj>
                   </mc:Choice>
@@ -14512,13 +14512,55 @@
       </p:grpSpPr>
       <p:sp>
         <p:nvSpPr>
-          <p:cNvPr id="29" name="TextBox 28"/>
+          <p:cNvPr id="63" name="TextBox 62"/>
           <p:cNvSpPr txBox="1"/>
           <p:nvPr/>
         </p:nvSpPr>
         <p:spPr>
           <a:xfrm>
-            <a:off x="19457728" y="4843583"/>
+            <a:off x="1002312" y="4843582"/>
+            <a:ext cx="8592195" cy="22725577"/>
+          </a:xfrm>
+          <a:prstGeom prst="rect">
+            <a:avLst/>
+          </a:prstGeom>
+        </p:spPr>
+        <p:style>
+          <a:lnRef idx="2">
+            <a:schemeClr val="accent1"/>
+          </a:lnRef>
+          <a:fillRef idx="1">
+            <a:schemeClr val="lt1"/>
+          </a:fillRef>
+          <a:effectRef idx="0">
+            <a:schemeClr val="accent1"/>
+          </a:effectRef>
+          <a:fontRef idx="minor">
+            <a:schemeClr val="dk1"/>
+          </a:fontRef>
+        </p:style>
+        <p:txBody>
+          <a:bodyPr wrap="square" rtlCol="0">
+            <a:spAutoFit/>
+          </a:bodyPr>
+          <a:lstStyle/>
+          <a:p>
+            <a:endParaRPr lang="en-US" sz="2500" dirty="0">
+              <a:latin typeface="Times New Roman" panose="02020603050405020304" pitchFamily="18" charset="0"/>
+              <a:cs typeface="Times New Roman" panose="02020603050405020304" pitchFamily="18" charset="0"/>
+            </a:endParaRPr>
+          </a:p>
+        </p:txBody>
+      </p:sp>
+      <p:sp>
+        <p:nvSpPr>
+          <p:cNvPr id="62" name="TextBox 61"/>
+          <p:cNvSpPr txBox="1"/>
+          <p:nvPr/>
+        </p:nvSpPr>
+        <p:spPr>
+          <a:xfrm>
+            <a:off x="10228480" y="4788931"/>
             <a:ext cx="8792765" cy="22725577"/>
           </a:xfrm>
           <a:prstGeom prst="rect">
@@ -14554,55 +14596,13 @@
       </p:sp>
       <p:sp>
         <p:nvSpPr>
-          <p:cNvPr id="28" name="TextBox 27"/>
+          <p:cNvPr id="29" name="TextBox 28"/>
           <p:cNvSpPr txBox="1"/>
           <p:nvPr/>
         </p:nvSpPr>
         <p:spPr>
           <a:xfrm>
-            <a:off x="764853" y="4843583"/>
-            <a:ext cx="8792765" cy="22725577"/>
-          </a:xfrm>
-          <a:prstGeom prst="rect">
-            <a:avLst/>
-          </a:prstGeom>
-        </p:spPr>
-        <p:style>
-          <a:lnRef idx="2">
-            <a:schemeClr val="accent1"/>
-          </a:lnRef>
-          <a:fillRef idx="1">
-            <a:schemeClr val="lt1"/>
-          </a:fillRef>
-          <a:effectRef idx="0">
-            <a:schemeClr val="accent1"/>
-          </a:effectRef>
-          <a:fontRef idx="minor">
-            <a:schemeClr val="dk1"/>
-          </a:fontRef>
-        </p:style>
-        <p:txBody>
-          <a:bodyPr wrap="square" rtlCol="0">
-            <a:spAutoFit/>
-          </a:bodyPr>
-          <a:lstStyle/>
-          <a:p>
-            <a:endParaRPr lang="en-US" sz="2500" dirty="0">
-              <a:latin typeface="Times New Roman" panose="02020603050405020304" pitchFamily="18" charset="0"/>
-              <a:cs typeface="Times New Roman" panose="02020603050405020304" pitchFamily="18" charset="0"/>
-            </a:endParaRPr>
-          </a:p>
-        </p:txBody>
-      </p:sp>
-      <p:sp>
-        <p:nvSpPr>
-          <p:cNvPr id="9" name="TextBox 8"/>
-          <p:cNvSpPr txBox="1"/>
-          <p:nvPr/>
-        </p:nvSpPr>
-        <p:spPr>
-          <a:xfrm>
-            <a:off x="10120450" y="4843583"/>
+            <a:off x="19457728" y="4843583"/>
             <a:ext cx="8792765" cy="22725577"/>
           </a:xfrm>
           <a:prstGeom prst="rect">
@@ -14711,32 +14711,9 @@
                   <a:srgbClr val="002060"/>
                 </a:solidFill>
               </a:rPr>
-              <a:t>DATA</a:t>
+              <a:t>DATA COLLECTION</a:t>
             </a:r>
             <a:endParaRPr lang="en-US" u="none" dirty="0">
-              <a:solidFill>
-                <a:srgbClr val="002060"/>
-              </a:solidFill>
-            </a:endParaRPr>
-          </a:p>
-        </p:txBody>
-      </p:sp>
-      <p:sp>
-        <p:nvSpPr>
-          <p:cNvPr id="22" name="Text Placeholder 21"/>
-          <p:cNvSpPr>
-            <a:spLocks noGrp="1"/>
-          </p:cNvSpPr>
-          <p:nvPr>
-            <p:ph type="body" sz="quarter" idx="21"/>
-          </p:nvPr>
-        </p:nvSpPr>
-        <p:spPr/>
-        <p:txBody>
-          <a:bodyPr/>
-          <a:lstStyle/>
-          <a:p>
-            <a:endParaRPr lang="en-US">
               <a:solidFill>
                 <a:srgbClr val="002060"/>
               </a:solidFill>
@@ -14770,32 +14747,9 @@
                   <a:srgbClr val="002060"/>
                 </a:solidFill>
               </a:rPr>
-              <a:t>SALARY ANALYSIS</a:t>
+              <a:t>CHALLENGES</a:t>
             </a:r>
             <a:endParaRPr lang="en-US" u="none" dirty="0">
-              <a:solidFill>
-                <a:srgbClr val="002060"/>
-              </a:solidFill>
-            </a:endParaRPr>
-          </a:p>
-        </p:txBody>
-      </p:sp>
-      <p:sp>
-        <p:nvSpPr>
-          <p:cNvPr id="24" name="Text Placeholder 23"/>
-          <p:cNvSpPr>
-            <a:spLocks noGrp="1"/>
-          </p:cNvSpPr>
-          <p:nvPr>
-            <p:ph type="body" sz="quarter" idx="23"/>
-          </p:nvPr>
-        </p:nvSpPr>
-        <p:spPr/>
-        <p:txBody>
-          <a:bodyPr/>
-          <a:lstStyle/>
-          <a:p>
-            <a:endParaRPr lang="en-US">
               <a:solidFill>
                 <a:srgbClr val="002060"/>
               </a:solidFill>
@@ -14842,29 +14796,6 @@
           </p:cNvSpPr>
           <p:nvPr>
             <p:ph type="body" sz="quarter" idx="26"/>
-          </p:nvPr>
-        </p:nvSpPr>
-        <p:spPr/>
-        <p:txBody>
-          <a:bodyPr/>
-          <a:lstStyle/>
-          <a:p>
-            <a:endParaRPr lang="en-US" dirty="0">
-              <a:solidFill>
-                <a:srgbClr val="002060"/>
-              </a:solidFill>
-            </a:endParaRPr>
-          </a:p>
-        </p:txBody>
-      </p:sp>
-      <p:sp>
-        <p:nvSpPr>
-          <p:cNvPr id="32" name="Text Placeholder 31"/>
-          <p:cNvSpPr>
-            <a:spLocks noGrp="1"/>
-          </p:cNvSpPr>
-          <p:nvPr>
-            <p:ph type="body" sz="quarter" idx="96"/>
           </p:nvPr>
         </p:nvSpPr>
         <p:spPr/>
@@ -15074,7 +15005,7 @@
         </p:blipFill>
         <p:spPr>
           <a:xfrm>
-            <a:off x="10734295" y="12424377"/>
+            <a:off x="10676393" y="12244062"/>
             <a:ext cx="7601712" cy="4303776"/>
           </a:xfrm>
           <a:prstGeom prst="rect">
@@ -15104,8 +15035,8 @@
         </p:blipFill>
         <p:spPr>
           <a:xfrm>
-            <a:off x="20187666" y="11545368"/>
-            <a:ext cx="7363968" cy="7174992"/>
+            <a:off x="20818562" y="9466728"/>
+            <a:ext cx="6071096" cy="5915298"/>
           </a:xfrm>
           <a:prstGeom prst="rect">
             <a:avLst/>
@@ -15180,8 +15111,8 @@
         </p:nvSpPr>
         <p:spPr>
           <a:xfrm>
-            <a:off x="28805412" y="4843583"/>
-            <a:ext cx="8792765" cy="22725577"/>
+            <a:off x="28805413" y="4843583"/>
+            <a:ext cx="8456388" cy="22725577"/>
           </a:xfrm>
           <a:prstGeom prst="rect">
             <a:avLst/>
@@ -15241,6 +15172,536 @@
               <a:solidFill>
                 <a:srgbClr val="002060"/>
               </a:solidFill>
+            </a:endParaRPr>
+          </a:p>
+        </p:txBody>
+      </p:sp>
+      <p:pic>
+        <p:nvPicPr>
+          <p:cNvPr id="4098" name="Picture 2" descr="ata Collection Visual (2).png"/>
+          <p:cNvPicPr>
+            <a:picLocks noChangeAspect="1" noChangeArrowheads="1"/>
+          </p:cNvPicPr>
+          <p:nvPr/>
+        </p:nvPicPr>
+        <p:blipFill>
+          <a:blip r:embed="rId7">
+            <a:extLst>
+              <a:ext uri="{28A0092B-C50C-407E-A947-70E740481C1C}">
+                <a14:useLocalDpi xmlns:a14="http://schemas.microsoft.com/office/drawing/2010/main" val="0"/>
+              </a:ext>
+            </a:extLst>
+          </a:blip>
+          <a:srcRect/>
+          <a:stretch>
+            <a:fillRect/>
+          </a:stretch>
+        </p:blipFill>
+        <p:spPr bwMode="auto">
+          <a:xfrm>
+            <a:off x="1168231" y="13408222"/>
+            <a:ext cx="8045575" cy="6914298"/>
+          </a:xfrm>
+          <a:prstGeom prst="rect">
+            <a:avLst/>
+          </a:prstGeom>
+          <a:noFill/>
+          <a:extLst>
+            <a:ext uri="{909E8E84-426E-40DD-AFC4-6F175D3DCCD1}">
+              <a14:hiddenFill xmlns:a14="http://schemas.microsoft.com/office/drawing/2010/main">
+                <a:solidFill>
+                  <a:srgbClr val="FFFFFF"/>
+                </a:solidFill>
+              </a14:hiddenFill>
+            </a:ext>
+          </a:extLst>
+        </p:spPr>
+      </p:pic>
+      <p:sp>
+        <p:nvSpPr>
+          <p:cNvPr id="59" name="Text Placeholder 22"/>
+          <p:cNvSpPr>
+            <a:spLocks noGrp="1"/>
+          </p:cNvSpPr>
+          <p:nvPr>
+            <p:ph type="body" sz="quarter" idx="22"/>
+          </p:nvPr>
+        </p:nvSpPr>
+        <p:spPr>
+          <a:xfrm>
+            <a:off x="10538442" y="11254640"/>
+            <a:ext cx="7993423" cy="682936"/>
+          </a:xfrm>
+        </p:spPr>
+        <p:txBody>
+          <a:bodyPr/>
+          <a:lstStyle/>
+          <a:p>
+            <a:r>
+              <a:rPr lang="en-US" u="none" dirty="0" smtClean="0">
+                <a:solidFill>
+                  <a:srgbClr val="002060"/>
+                </a:solidFill>
+              </a:rPr>
+              <a:t>SALARY ANALYSIS</a:t>
+            </a:r>
+            <a:endParaRPr lang="en-US" u="none" dirty="0">
+              <a:solidFill>
+                <a:srgbClr val="002060"/>
+              </a:solidFill>
+            </a:endParaRPr>
+          </a:p>
+        </p:txBody>
+      </p:sp>
+      <p:sp>
+        <p:nvSpPr>
+          <p:cNvPr id="60" name="Text Placeholder 24"/>
+          <p:cNvSpPr>
+            <a:spLocks noGrp="1"/>
+          </p:cNvSpPr>
+          <p:nvPr>
+            <p:ph type="body" sz="quarter" idx="24"/>
+          </p:nvPr>
+        </p:nvSpPr>
+        <p:spPr>
+          <a:xfrm>
+            <a:off x="19438021" y="15864902"/>
+            <a:ext cx="8801100" cy="682936"/>
+          </a:xfrm>
+        </p:spPr>
+        <p:txBody>
+          <a:bodyPr/>
+          <a:lstStyle/>
+          <a:p>
+            <a:r>
+              <a:rPr lang="en-US" u="none" dirty="0" smtClean="0">
+                <a:solidFill>
+                  <a:srgbClr val="002060"/>
+                </a:solidFill>
+              </a:rPr>
+              <a:t>COMBINE NEAREST NEIGHBORS</a:t>
+            </a:r>
+            <a:endParaRPr lang="en-US" u="none" dirty="0">
+              <a:solidFill>
+                <a:srgbClr val="002060"/>
+              </a:solidFill>
+            </a:endParaRPr>
+          </a:p>
+        </p:txBody>
+      </p:sp>
+      <p:sp>
+        <p:nvSpPr>
+          <p:cNvPr id="3" name="TextBox 2"/>
+          <p:cNvSpPr txBox="1"/>
+          <p:nvPr/>
+        </p:nvSpPr>
+        <p:spPr>
+          <a:xfrm>
+            <a:off x="19870527" y="17066783"/>
+            <a:ext cx="7936088" cy="3370153"/>
+          </a:xfrm>
+          <a:prstGeom prst="rect">
+            <a:avLst/>
+          </a:prstGeom>
+          <a:noFill/>
+        </p:spPr>
+        <p:txBody>
+          <a:bodyPr wrap="square" rtlCol="0">
+            <a:spAutoFit/>
+          </a:bodyPr>
+          <a:lstStyle/>
+          <a:p>
+            <a:r>
+              <a:rPr lang="en-US" sz="2000" dirty="0"/>
+              <a:t>We performed a </a:t>
+            </a:r>
+            <a:r>
+              <a:rPr lang="en-US" sz="2000" b="1" dirty="0"/>
+              <a:t>k nearest neighbors</a:t>
+            </a:r>
+            <a:r>
+              <a:rPr lang="en-US" sz="2000" dirty="0"/>
+              <a:t> algorithm using the combine and AV data that we collected in order to determine the projected seasonal AV of all </a:t>
+            </a:r>
+            <a:r>
+              <a:rPr lang="en-US" sz="2000" b="1" dirty="0"/>
+              <a:t>players selected in the first round of the 2017 NFL draft</a:t>
+            </a:r>
+            <a:r>
+              <a:rPr lang="en-US" sz="2000" dirty="0"/>
+              <a:t>. We based this analysis purely on </a:t>
+            </a:r>
+            <a:r>
+              <a:rPr lang="en-US" sz="2000" b="1" dirty="0"/>
+              <a:t>combine metrics</a:t>
+            </a:r>
+            <a:r>
+              <a:rPr lang="en-US" sz="2000" dirty="0"/>
+              <a:t>, choosing to ignore other </a:t>
+            </a:r>
+            <a:r>
+              <a:rPr lang="en-US" sz="2000" dirty="0" err="1"/>
+              <a:t>measurables</a:t>
+            </a:r>
+            <a:r>
+              <a:rPr lang="en-US" sz="2000" dirty="0"/>
+              <a:t> such as college statistics, personality, and injury history that NFL teams often utilize to evaluate draft prospects. The results below were obtained using a k value of 3 and by limiting </a:t>
+            </a:r>
+            <a:r>
+              <a:rPr lang="en-US" sz="2000" dirty="0" err="1" smtClean="0"/>
+              <a:t>comparisoxn</a:t>
+            </a:r>
+            <a:r>
+              <a:rPr lang="en-US" sz="2000" dirty="0" smtClean="0"/>
+              <a:t> </a:t>
+            </a:r>
+            <a:r>
+              <a:rPr lang="en-US" sz="2000" dirty="0"/>
+              <a:t>to neighbors with the same position.</a:t>
+            </a:r>
+            <a:endParaRPr lang="en-US" sz="2000" dirty="0"/>
+          </a:p>
+          <a:p>
+            <a:r>
+              <a:rPr lang="en-US" sz="2800" dirty="0"/>
+              <a:t/>
+            </a:r>
+            <a:br>
+              <a:rPr lang="en-US" sz="2800" dirty="0"/>
+            </a:br>
+            <a:endParaRPr lang="en-US" sz="2500" dirty="0">
+              <a:latin typeface="Times New Roman" panose="02020603050405020304" pitchFamily="18" charset="0"/>
+              <a:cs typeface="Times New Roman" panose="02020603050405020304" pitchFamily="18" charset="0"/>
+            </a:endParaRPr>
+          </a:p>
+        </p:txBody>
+      </p:sp>
+      <p:sp>
+        <p:nvSpPr>
+          <p:cNvPr id="61" name="TextBox 60"/>
+          <p:cNvSpPr txBox="1"/>
+          <p:nvPr/>
+        </p:nvSpPr>
+        <p:spPr>
+          <a:xfrm>
+            <a:off x="19886066" y="6028596"/>
+            <a:ext cx="7936088" cy="3677930"/>
+          </a:xfrm>
+          <a:prstGeom prst="rect">
+            <a:avLst/>
+          </a:prstGeom>
+          <a:noFill/>
+        </p:spPr>
+        <p:txBody>
+          <a:bodyPr wrap="square" rtlCol="0">
+            <a:spAutoFit/>
+          </a:bodyPr>
+          <a:lstStyle/>
+          <a:p>
+            <a:r>
+              <a:rPr lang="en-US" sz="2000" dirty="0" smtClean="0"/>
+              <a:t>Our analysis of the draft dates from </a:t>
+            </a:r>
+            <a:r>
+              <a:rPr lang="en-US" sz="2000" b="1" dirty="0" smtClean="0"/>
+              <a:t>1980</a:t>
+            </a:r>
+            <a:r>
+              <a:rPr lang="en-US" sz="2000" dirty="0" smtClean="0"/>
+              <a:t>, and groups all players in a given position and drafted in the same round together (with the exception of Round 8 and undrafted players). The results show clearly: </a:t>
+            </a:r>
+          </a:p>
+          <a:p>
+            <a:endParaRPr lang="en-US" sz="2000" dirty="0" smtClean="0"/>
+          </a:p>
+          <a:p>
+            <a:pPr marL="342900" indent="-342900">
+              <a:buFont typeface="Arial" charset="0"/>
+              <a:buChar char="•"/>
+            </a:pPr>
+            <a:r>
+              <a:rPr lang="en-US" sz="2000" dirty="0"/>
+              <a:t>A</a:t>
+            </a:r>
+            <a:r>
+              <a:rPr lang="en-US" sz="2000" dirty="0" smtClean="0"/>
+              <a:t> </a:t>
+            </a:r>
+            <a:r>
+              <a:rPr lang="en-US" sz="2000" b="1" dirty="0" smtClean="0"/>
+              <a:t>decreasing</a:t>
+            </a:r>
+            <a:r>
+              <a:rPr lang="en-US" sz="2000" dirty="0" smtClean="0"/>
+              <a:t> total average AV value as the draft rounds increase</a:t>
+            </a:r>
+          </a:p>
+          <a:p>
+            <a:pPr marL="342900" indent="-342900">
+              <a:buFont typeface="Arial" charset="0"/>
+              <a:buChar char="•"/>
+            </a:pPr>
+            <a:r>
+              <a:rPr lang="en-US" sz="2000" dirty="0"/>
+              <a:t>A</a:t>
+            </a:r>
+            <a:r>
+              <a:rPr lang="en-US" sz="2000" dirty="0" smtClean="0"/>
+              <a:t> </a:t>
+            </a:r>
+            <a:r>
+              <a:rPr lang="en-US" sz="2000" b="1" dirty="0" smtClean="0"/>
+              <a:t>higher</a:t>
+            </a:r>
+            <a:r>
+              <a:rPr lang="en-US" sz="2000" dirty="0" smtClean="0"/>
+              <a:t> contribution to AV from certain positions such as quarterbacks (QB)</a:t>
+            </a:r>
+          </a:p>
+          <a:p>
+            <a:pPr marL="342900" indent="-342900">
+              <a:buFont typeface="Arial" charset="0"/>
+              <a:buChar char="•"/>
+            </a:pPr>
+            <a:r>
+              <a:rPr lang="en-US" sz="2000" dirty="0" smtClean="0"/>
+              <a:t>A relatively </a:t>
+            </a:r>
+            <a:r>
+              <a:rPr lang="en-US" sz="2000" b="1" dirty="0" smtClean="0"/>
+              <a:t>steady</a:t>
+            </a:r>
+            <a:r>
+              <a:rPr lang="en-US" sz="2000" dirty="0" smtClean="0"/>
+              <a:t> average AV value for kickers (K) indicating that teams may wish to draft these positions in later rounds.</a:t>
+            </a:r>
+            <a:endParaRPr lang="en-US" sz="2000" dirty="0"/>
+          </a:p>
+          <a:p>
+            <a:r>
+              <a:rPr lang="en-US" sz="2800" dirty="0"/>
+              <a:t/>
+            </a:r>
+            <a:br>
+              <a:rPr lang="en-US" sz="2800" dirty="0"/>
+            </a:br>
+            <a:endParaRPr lang="en-US" sz="2500" dirty="0">
+              <a:latin typeface="Times New Roman" panose="02020603050405020304" pitchFamily="18" charset="0"/>
+              <a:cs typeface="Times New Roman" panose="02020603050405020304" pitchFamily="18" charset="0"/>
+            </a:endParaRPr>
+          </a:p>
+        </p:txBody>
+      </p:sp>
+      <p:sp>
+        <p:nvSpPr>
+          <p:cNvPr id="8" name="TextBox 7"/>
+          <p:cNvSpPr txBox="1"/>
+          <p:nvPr/>
+        </p:nvSpPr>
+        <p:spPr>
+          <a:xfrm>
+            <a:off x="1429928" y="20812368"/>
+            <a:ext cx="7783878" cy="5324535"/>
+          </a:xfrm>
+          <a:prstGeom prst="rect">
+            <a:avLst/>
+          </a:prstGeom>
+          <a:noFill/>
+        </p:spPr>
+        <p:txBody>
+          <a:bodyPr wrap="square" rtlCol="0">
+            <a:spAutoFit/>
+          </a:bodyPr>
+          <a:lstStyle/>
+          <a:p>
+            <a:r>
+              <a:rPr lang="en-US" sz="2000" dirty="0" smtClean="0"/>
+              <a:t>- We </a:t>
+            </a:r>
+            <a:r>
+              <a:rPr lang="en-US" sz="2000" b="1" dirty="0"/>
+              <a:t>collected </a:t>
+            </a:r>
+            <a:r>
+              <a:rPr lang="en-US" sz="2000" dirty="0"/>
+              <a:t>AV data from 1978 to 2016 from </a:t>
+            </a:r>
+            <a:r>
+              <a:rPr lang="en-US" sz="2000" i="1" dirty="0"/>
+              <a:t>Pro Football Reference,</a:t>
+            </a:r>
+            <a:r>
+              <a:rPr lang="en-US" sz="2000" dirty="0"/>
+              <a:t> roster data from 1978 to 2016 from </a:t>
+            </a:r>
+            <a:r>
+              <a:rPr lang="en-US" sz="2000" i="1" dirty="0"/>
+              <a:t>Pro Football Reference</a:t>
+            </a:r>
+            <a:r>
+              <a:rPr lang="en-US" sz="2000" dirty="0"/>
+              <a:t> and</a:t>
+            </a:r>
+            <a:r>
+              <a:rPr lang="en-US" sz="2000" i="1" dirty="0"/>
+              <a:t> The Football Database</a:t>
+            </a:r>
+            <a:r>
+              <a:rPr lang="en-US" sz="2000" dirty="0"/>
+              <a:t>, combine data from 1999 to 2017 from</a:t>
+            </a:r>
+            <a:r>
+              <a:rPr lang="en-US" sz="2000" i="1" dirty="0"/>
+              <a:t> Pro Football Reference</a:t>
+            </a:r>
+            <a:r>
+              <a:rPr lang="en-US" sz="2000" dirty="0"/>
+              <a:t> and </a:t>
+            </a:r>
+            <a:r>
+              <a:rPr lang="en-US" sz="2000" i="1" dirty="0"/>
+              <a:t>NFL Combine Results</a:t>
+            </a:r>
+            <a:r>
+              <a:rPr lang="en-US" sz="2000" dirty="0"/>
+              <a:t>, standings data from 1978 to 2016 from </a:t>
+            </a:r>
+            <a:r>
+              <a:rPr lang="en-US" sz="2000" i="1" dirty="0"/>
+              <a:t>Pro Football Reference</a:t>
+            </a:r>
+            <a:r>
+              <a:rPr lang="en-US" sz="2000" dirty="0"/>
+              <a:t>, and salary data from 1994 to 2021 from </a:t>
+            </a:r>
+            <a:r>
+              <a:rPr lang="en-US" sz="2000" i="1" dirty="0" err="1"/>
+              <a:t>Spotrac</a:t>
+            </a:r>
+            <a:r>
+              <a:rPr lang="en-US" sz="2000" dirty="0"/>
+              <a:t>.</a:t>
+            </a:r>
+          </a:p>
+          <a:p>
+            <a:r>
+              <a:rPr lang="en-US" sz="2000" dirty="0" smtClean="0"/>
+              <a:t>his </a:t>
+            </a:r>
+            <a:r>
+              <a:rPr lang="en-US" sz="2000" dirty="0"/>
+              <a:t>data using Python’s </a:t>
+            </a:r>
+            <a:r>
+              <a:rPr lang="en-US" sz="2000" dirty="0" err="1"/>
+              <a:t>BeautifulSoup</a:t>
+            </a:r>
+            <a:r>
+              <a:rPr lang="en-US" sz="2000" dirty="0"/>
+              <a:t> package.</a:t>
+            </a:r>
+          </a:p>
+          <a:p>
+            <a:r>
+              <a:rPr lang="en-US" sz="2000" dirty="0"/>
+              <a:t>- We </a:t>
+            </a:r>
+            <a:r>
+              <a:rPr lang="en-US" sz="2000" b="1" dirty="0"/>
+              <a:t>stored</a:t>
+            </a:r>
+            <a:r>
+              <a:rPr lang="en-US" sz="2000" dirty="0"/>
+              <a:t> this data in CSV files.</a:t>
+            </a:r>
+          </a:p>
+          <a:p>
+            <a:r>
+              <a:rPr lang="en-US" sz="2000" dirty="0"/>
+              <a:t>- We </a:t>
+            </a:r>
+            <a:r>
+              <a:rPr lang="en-US" sz="2000" b="1" dirty="0"/>
+              <a:t>cleaned </a:t>
+            </a:r>
+            <a:r>
+              <a:rPr lang="en-US" sz="2000" dirty="0"/>
+              <a:t>the data in the CSV files and </a:t>
+            </a:r>
+            <a:r>
+              <a:rPr lang="en-US" sz="2000" b="1" dirty="0"/>
+              <a:t>merged </a:t>
+            </a:r>
+            <a:r>
+              <a:rPr lang="en-US" sz="2000" dirty="0"/>
+              <a:t>similar data. </a:t>
+            </a:r>
+          </a:p>
+          <a:p>
+            <a:r>
+              <a:rPr lang="en-US" sz="2000" b="1" dirty="0"/>
+              <a:t>- </a:t>
+            </a:r>
+            <a:r>
+              <a:rPr lang="en-US" sz="2000" dirty="0"/>
+              <a:t>We </a:t>
+            </a:r>
+            <a:r>
+              <a:rPr lang="en-US" sz="2000" b="1" dirty="0"/>
+              <a:t>loaded</a:t>
+            </a:r>
+            <a:r>
+              <a:rPr lang="en-US" sz="2000" dirty="0"/>
+              <a:t> the cleaned data into</a:t>
+            </a:r>
+            <a:r>
+              <a:rPr lang="en-US" sz="2000" b="1" dirty="0"/>
+              <a:t> SQL databases</a:t>
+            </a:r>
+            <a:r>
+              <a:rPr lang="en-US" sz="2000" dirty="0"/>
+              <a:t>. We decided that it would be best to store data used in separate parts of our project in different databases.</a:t>
+            </a:r>
+          </a:p>
+          <a:p>
+            <a:r>
+              <a:rPr lang="en-US" sz="2000" dirty="0"/>
+              <a:t>- We </a:t>
+            </a:r>
+            <a:r>
+              <a:rPr lang="en-US" sz="2000" b="1" dirty="0"/>
+              <a:t>created </a:t>
+            </a:r>
+            <a:r>
+              <a:rPr lang="en-US" sz="2000" dirty="0"/>
+              <a:t>custom-made CSV files with cleaned data using </a:t>
+            </a:r>
+            <a:r>
+              <a:rPr lang="en-US" sz="2000" b="1" dirty="0"/>
+              <a:t>SQL queries</a:t>
+            </a:r>
+            <a:r>
+              <a:rPr lang="en-US" sz="2000" dirty="0"/>
+              <a:t>.</a:t>
+            </a:r>
+          </a:p>
+          <a:p>
+            <a:r>
+              <a:rPr lang="en-US" sz="2000" dirty="0"/>
+              <a:t/>
+            </a:r>
+            <a:br>
+              <a:rPr lang="en-US" sz="2000" dirty="0"/>
+            </a:br>
+            <a:endParaRPr lang="en-US" sz="2000" dirty="0">
+              <a:latin typeface="Times New Roman" panose="02020603050405020304" pitchFamily="18" charset="0"/>
+              <a:cs typeface="Times New Roman" panose="02020603050405020304" pitchFamily="18" charset="0"/>
+            </a:endParaRPr>
+          </a:p>
+          <a:p>
+            <a:endParaRPr lang="en-US" sz="2000" dirty="0">
+              <a:latin typeface="Times New Roman" panose="02020603050405020304" pitchFamily="18" charset="0"/>
+              <a:cs typeface="Times New Roman" panose="02020603050405020304" pitchFamily="18" charset="0"/>
             </a:endParaRPr>
           </a:p>
         </p:txBody>

</xml_diff>